<commit_message>
feat: Complete 9-slide presentation - filled analytics, fixed logo, separated charts
</commit_message>
<xml_diff>
--- a/brief_compliant_20250901_20250907.pptx
+++ b/brief_compliant_20250901_20250907.pptx
@@ -3139,9 +3139,33 @@
           </a:p>
         </p:txBody>
       </p:sp>
-      <p:sp>
-        <p:nvSpPr>
-          <p:cNvPr id="3" name="TextBox 2"/>
+      <p:pic>
+        <p:nvPicPr>
+          <p:cNvPr id="3" name="Picture 2" descr="Логотип.png"/>
+          <p:cNvPicPr>
+            <a:picLocks noChangeAspect="1"/>
+          </p:cNvPicPr>
+          <p:nvPr/>
+        </p:nvPicPr>
+        <p:blipFill>
+          <a:blip r:embed="rId2"/>
+          <a:stretch>
+            <a:fillRect/>
+          </a:stretch>
+        </p:blipFill>
+        <p:spPr>
+          <a:xfrm>
+            <a:off x="10177272" y="182880"/>
+            <a:ext cx="685800" cy="685800"/>
+          </a:xfrm>
+          <a:prstGeom prst="rect">
+            <a:avLst/>
+          </a:prstGeom>
+        </p:spPr>
+      </p:pic>
+      <p:sp>
+        <p:nvSpPr>
+          <p:cNvPr id="4" name="TextBox 3"/>
           <p:cNvSpPr txBox="1"/>
           <p:nvPr/>
         </p:nvSpPr>
@@ -3177,7 +3201,7 @@
       </p:sp>
       <p:sp>
         <p:nvSpPr>
-          <p:cNvPr id="4" name="TextBox 3"/>
+          <p:cNvPr id="5" name="TextBox 4"/>
           <p:cNvSpPr txBox="1"/>
           <p:nvPr/>
         </p:nvSpPr>
@@ -3213,7 +3237,7 @@
       </p:sp>
       <p:sp>
         <p:nvSpPr>
-          <p:cNvPr id="5" name="TextBox 4"/>
+          <p:cNvPr id="6" name="TextBox 5"/>
           <p:cNvSpPr txBox="1"/>
           <p:nvPr/>
         </p:nvSpPr>
@@ -3249,7 +3273,7 @@
       </p:sp>
       <p:sp>
         <p:nvSpPr>
-          <p:cNvPr id="6" name="TextBox 5"/>
+          <p:cNvPr id="7" name="TextBox 6"/>
           <p:cNvSpPr txBox="1"/>
           <p:nvPr/>
         </p:nvSpPr>
@@ -3344,9 +3368,33 @@
           </a:p>
         </p:txBody>
       </p:sp>
-      <p:sp>
-        <p:nvSpPr>
-          <p:cNvPr id="3" name="TextBox 2"/>
+      <p:pic>
+        <p:nvPicPr>
+          <p:cNvPr id="3" name="Picture 2" descr="Логотип.png"/>
+          <p:cNvPicPr>
+            <a:picLocks noChangeAspect="1"/>
+          </p:cNvPicPr>
+          <p:nvPr/>
+        </p:nvPicPr>
+        <p:blipFill>
+          <a:blip r:embed="rId2"/>
+          <a:stretch>
+            <a:fillRect/>
+          </a:stretch>
+        </p:blipFill>
+        <p:spPr>
+          <a:xfrm>
+            <a:off x="10177272" y="182880"/>
+            <a:ext cx="685800" cy="685800"/>
+          </a:xfrm>
+          <a:prstGeom prst="rect">
+            <a:avLst/>
+          </a:prstGeom>
+        </p:spPr>
+      </p:pic>
+      <p:sp>
+        <p:nvSpPr>
+          <p:cNvPr id="4" name="TextBox 3"/>
           <p:cNvSpPr txBox="1"/>
           <p:nvPr/>
         </p:nvSpPr>
@@ -3382,7 +3430,7 @@
       </p:sp>
       <p:graphicFrame>
         <p:nvGraphicFramePr>
-          <p:cNvPr id="4" name="Table 3"/>
+          <p:cNvPr id="5" name="Table 4"/>
           <p:cNvGraphicFramePr>
             <a:graphicFrameLocks noGrp="1"/>
           </p:cNvGraphicFramePr>
@@ -4048,22 +4096,22 @@
       </p:graphicFrame>
       <p:pic>
         <p:nvPicPr>
-          <p:cNvPr id="5" name="Picture 4" descr="donut_metrics.png"/>
+          <p:cNvPr id="6" name="Picture 5" descr="donut_metrics.png"/>
           <p:cNvPicPr>
             <a:picLocks noChangeAspect="1"/>
           </p:cNvPicPr>
           <p:nvPr/>
         </p:nvPicPr>
         <p:blipFill>
-          <a:blip r:embed="rId2"/>
+          <a:blip r:embed="rId3"/>
           <a:stretch>
             <a:fillRect/>
           </a:stretch>
         </p:blipFill>
         <p:spPr>
           <a:xfrm>
-            <a:off x="8229600" y="1188720"/>
-            <a:ext cx="3200400" cy="2743200"/>
+            <a:off x="3657600" y="5669280"/>
+            <a:ext cx="4572000" cy="1097280"/>
           </a:xfrm>
           <a:prstGeom prst="rect">
             <a:avLst/>
@@ -4131,9 +4179,33 @@
           </a:p>
         </p:txBody>
       </p:sp>
-      <p:sp>
-        <p:nvSpPr>
-          <p:cNvPr id="3" name="TextBox 2"/>
+      <p:pic>
+        <p:nvPicPr>
+          <p:cNvPr id="3" name="Picture 2" descr="Логотип.png"/>
+          <p:cNvPicPr>
+            <a:picLocks noChangeAspect="1"/>
+          </p:cNvPicPr>
+          <p:nvPr/>
+        </p:nvPicPr>
+        <p:blipFill>
+          <a:blip r:embed="rId2"/>
+          <a:stretch>
+            <a:fillRect/>
+          </a:stretch>
+        </p:blipFill>
+        <p:spPr>
+          <a:xfrm>
+            <a:off x="10177272" y="182880"/>
+            <a:ext cx="685800" cy="685800"/>
+          </a:xfrm>
+          <a:prstGeom prst="rect">
+            <a:avLst/>
+          </a:prstGeom>
+        </p:spPr>
+      </p:pic>
+      <p:sp>
+        <p:nvSpPr>
+          <p:cNvPr id="4" name="TextBox 3"/>
           <p:cNvSpPr txBox="1"/>
           <p:nvPr/>
         </p:nvSpPr>
@@ -4169,7 +4241,7 @@
       </p:sp>
       <p:sp>
         <p:nvSpPr>
-          <p:cNvPr id="4" name="TextBox 3"/>
+          <p:cNvPr id="5" name="TextBox 4"/>
           <p:cNvSpPr txBox="1"/>
           <p:nvPr/>
         </p:nvSpPr>
@@ -4201,7 +4273,7 @@
               </a:defRPr>
             </a:pPr>
             <a:r>
-              <a:t>За период 01.09.2025—07.09.2025 количество перезвонить по заявкам составило 111 из 164 (67,7%), что является положительным показателем. Однако количество обработанных заявок превысило плановое значение (18 из 16, 112,5%), а сумма заявок значительно выше ожидаемой (646,0 из 204,0 млн, 316,7%).</a:t>
+              <a:t>За период 01.09.2025—07.09.2025 количество перезвонить по заявкам составило 111 из 164 (67,7%), что является хорошим показателем. Однако количество обработанных заявок превысило плановое (18 из 16, 112,5%) и объём заявок в миллионах также значительно превысил план (646,0 из 204,0, 316,7%). Это может свидетельствовать о высоком спросе на банковские гарантии.</a:t>
             </a:r>
           </a:p>
           <a:p>
@@ -4230,7 +4302,7 @@
               </a:defRPr>
             </a:pPr>
             <a:r>
-              <a:t>Узкое место: необходимо более детально проанализировать причины значительного превышения суммы заявок.</a:t>
+              <a:t>Узкое место — необходимо оптимизировать процесс обработки заявок для более точного планирования и выполнения плановых показателей.</a:t>
             </a:r>
           </a:p>
           <a:p>
@@ -4275,7 +4347,7 @@
               </a:defRPr>
             </a:pPr>
             <a:r>
-              <a:t>1. Проанализировать причины значительного превышения суммы заявок.</a:t>
+              <a:t>1. Провести анализ причин превышения плановых показателей по заявкам.</a:t>
             </a:r>
           </a:p>
           <a:p>
@@ -4291,7 +4363,7 @@
               </a:defRPr>
             </a:pPr>
             <a:r>
-              <a:t>2. Оптимизировать процесс обработки заявок для соответствия плановым показателям.</a:t>
+              <a:t>2. Скорректировать план обработки заявок с учётом текущей динамики.</a:t>
             </a:r>
           </a:p>
           <a:p>
@@ -4307,7 +4379,7 @@
               </a:defRPr>
             </a:pPr>
             <a:r>
-              <a:t>3. Провести дополнительные консультации с клиентами по условиям и порядку получения банковских гарантий.</a:t>
+              <a:t>3. Организовать совещание с отделом для обсуждения оптимизации процессов.</a:t>
             </a:r>
           </a:p>
         </p:txBody>
@@ -4373,45 +4445,9 @@
           </a:p>
         </p:txBody>
       </p:sp>
-      <p:sp>
-        <p:nvSpPr>
-          <p:cNvPr id="3" name="TextBox 2"/>
-          <p:cNvSpPr txBox="1"/>
-          <p:nvPr/>
-        </p:nvSpPr>
-        <p:spPr>
-          <a:xfrm>
-            <a:off x="540000" y="457200"/>
-            <a:ext cx="11108952" cy="548640"/>
-          </a:xfrm>
-          <a:prstGeom prst="rect">
-            <a:avLst/>
-          </a:prstGeom>
-          <a:noFill/>
-        </p:spPr>
-        <p:txBody>
-          <a:bodyPr wrap="none">
-            <a:spAutoFit/>
-          </a:bodyPr>
-          <a:lstStyle/>
-          <a:p>
-            <a:pPr algn="ctr">
-              <a:defRPr sz="2800" b="1">
-                <a:solidFill>
-                  <a:srgbClr val="2E7D32"/>
-                </a:solidFill>
-                <a:latin typeface="Roboto"/>
-              </a:defRPr>
-            </a:pPr>
-            <a:r>
-              <a:t>Сравнение с предыдущим периодом</a:t>
-            </a:r>
-          </a:p>
-        </p:txBody>
-      </p:sp>
       <p:pic>
         <p:nvPicPr>
-          <p:cNvPr id="4" name="Picture 3" descr="comparison_bars.png"/>
+          <p:cNvPr id="3" name="Picture 2" descr="Логотип.png"/>
           <p:cNvPicPr>
             <a:picLocks noChangeAspect="1"/>
           </p:cNvPicPr>
@@ -4425,17 +4461,53 @@
         </p:blipFill>
         <p:spPr>
           <a:xfrm>
-            <a:off x="914400" y="1371600"/>
-            <a:ext cx="5029200" cy="2743200"/>
+            <a:off x="10177272" y="182880"/>
+            <a:ext cx="685800" cy="685800"/>
           </a:xfrm>
           <a:prstGeom prst="rect">
             <a:avLst/>
           </a:prstGeom>
         </p:spPr>
       </p:pic>
+      <p:sp>
+        <p:nvSpPr>
+          <p:cNvPr id="4" name="TextBox 3"/>
+          <p:cNvSpPr txBox="1"/>
+          <p:nvPr/>
+        </p:nvSpPr>
+        <p:spPr>
+          <a:xfrm>
+            <a:off x="540000" y="457200"/>
+            <a:ext cx="11108952" cy="548640"/>
+          </a:xfrm>
+          <a:prstGeom prst="rect">
+            <a:avLst/>
+          </a:prstGeom>
+          <a:noFill/>
+        </p:spPr>
+        <p:txBody>
+          <a:bodyPr wrap="none">
+            <a:spAutoFit/>
+          </a:bodyPr>
+          <a:lstStyle/>
+          <a:p>
+            <a:pPr algn="ctr">
+              <a:defRPr sz="2800" b="1">
+                <a:solidFill>
+                  <a:srgbClr val="2E7D32"/>
+                </a:solidFill>
+                <a:latin typeface="Roboto"/>
+              </a:defRPr>
+            </a:pPr>
+            <a:r>
+              <a:t>Сравнение с предыдущим периодом</a:t>
+            </a:r>
+          </a:p>
+        </p:txBody>
+      </p:sp>
       <p:pic>
         <p:nvPicPr>
-          <p:cNvPr id="5" name="Picture 4" descr="dynamics_line.png"/>
+          <p:cNvPr id="5" name="Picture 4" descr="comparison_bars.png"/>
           <p:cNvPicPr>
             <a:picLocks noChangeAspect="1"/>
           </p:cNvPicPr>
@@ -4449,7 +4521,7 @@
         </p:blipFill>
         <p:spPr>
           <a:xfrm>
-            <a:off x="6400800" y="1371600"/>
+            <a:off x="914400" y="1371600"/>
             <a:ext cx="5029200" cy="2743200"/>
           </a:xfrm>
           <a:prstGeom prst="rect">
@@ -4459,7 +4531,7 @@
       </p:pic>
       <p:pic>
         <p:nvPicPr>
-          <p:cNvPr id="6" name="Picture 5" descr="donut_metrics.png"/>
+          <p:cNvPr id="6" name="Picture 5" descr="dynamics_line.png"/>
           <p:cNvPicPr>
             <a:picLocks noChangeAspect="1"/>
           </p:cNvPicPr>
@@ -4467,6 +4539,30 @@
         </p:nvPicPr>
         <p:blipFill>
           <a:blip r:embed="rId4"/>
+          <a:stretch>
+            <a:fillRect/>
+          </a:stretch>
+        </p:blipFill>
+        <p:spPr>
+          <a:xfrm>
+            <a:off x="6400800" y="1371600"/>
+            <a:ext cx="5029200" cy="2743200"/>
+          </a:xfrm>
+          <a:prstGeom prst="rect">
+            <a:avLst/>
+          </a:prstGeom>
+        </p:spPr>
+      </p:pic>
+      <p:pic>
+        <p:nvPicPr>
+          <p:cNvPr id="7" name="Picture 6" descr="donut_metrics.png"/>
+          <p:cNvPicPr>
+            <a:picLocks noChangeAspect="1"/>
+          </p:cNvPicPr>
+          <p:nvPr/>
+        </p:nvPicPr>
+        <p:blipFill>
+          <a:blip r:embed="rId5"/>
           <a:stretch>
             <a:fillRect/>
           </a:stretch>
@@ -4542,9 +4638,33 @@
           </a:p>
         </p:txBody>
       </p:sp>
-      <p:sp>
-        <p:nvSpPr>
-          <p:cNvPr id="3" name="TextBox 2"/>
+      <p:pic>
+        <p:nvPicPr>
+          <p:cNvPr id="3" name="Picture 2" descr="Логотип.png"/>
+          <p:cNvPicPr>
+            <a:picLocks noChangeAspect="1"/>
+          </p:cNvPicPr>
+          <p:nvPr/>
+        </p:nvPicPr>
+        <p:blipFill>
+          <a:blip r:embed="rId2"/>
+          <a:stretch>
+            <a:fillRect/>
+          </a:stretch>
+        </p:blipFill>
+        <p:spPr>
+          <a:xfrm>
+            <a:off x="10177272" y="182880"/>
+            <a:ext cx="685800" cy="685800"/>
+          </a:xfrm>
+          <a:prstGeom prst="rect">
+            <a:avLst/>
+          </a:prstGeom>
+        </p:spPr>
+      </p:pic>
+      <p:sp>
+        <p:nvSpPr>
+          <p:cNvPr id="4" name="TextBox 3"/>
           <p:cNvSpPr txBox="1"/>
           <p:nvPr/>
         </p:nvSpPr>
@@ -4580,7 +4700,7 @@
       </p:sp>
       <p:sp>
         <p:nvSpPr>
-          <p:cNvPr id="4" name="Rounded Rectangle 3"/>
+          <p:cNvPr id="5" name="Rounded Rectangle 4"/>
           <p:cNvSpPr/>
           <p:nvPr/>
         </p:nvSpPr>
@@ -4623,7 +4743,7 @@
       </p:sp>
       <p:sp>
         <p:nvSpPr>
-          <p:cNvPr id="5" name="TextBox 4"/>
+          <p:cNvPr id="6" name="TextBox 5"/>
           <p:cNvSpPr txBox="1"/>
           <p:nvPr/>
         </p:nvSpPr>
@@ -4659,7 +4779,7 @@
       </p:sp>
       <p:sp>
         <p:nvSpPr>
-          <p:cNvPr id="6" name="TextBox 5"/>
+          <p:cNvPr id="7" name="TextBox 6"/>
           <p:cNvSpPr txBox="1"/>
           <p:nvPr/>
         </p:nvSpPr>
@@ -4695,7 +4815,7 @@
       </p:sp>
       <p:sp>
         <p:nvSpPr>
-          <p:cNvPr id="7" name="TextBox 6"/>
+          <p:cNvPr id="8" name="TextBox 7"/>
           <p:cNvSpPr txBox="1"/>
           <p:nvPr/>
         </p:nvSpPr>
@@ -4731,7 +4851,7 @@
       </p:sp>
       <p:sp>
         <p:nvSpPr>
-          <p:cNvPr id="8" name="Rounded Rectangle 7"/>
+          <p:cNvPr id="9" name="Rounded Rectangle 8"/>
           <p:cNvSpPr/>
           <p:nvPr/>
         </p:nvSpPr>
@@ -4774,7 +4894,7 @@
       </p:sp>
       <p:sp>
         <p:nvSpPr>
-          <p:cNvPr id="9" name="TextBox 8"/>
+          <p:cNvPr id="10" name="TextBox 9"/>
           <p:cNvSpPr txBox="1"/>
           <p:nvPr/>
         </p:nvSpPr>
@@ -4810,7 +4930,7 @@
       </p:sp>
       <p:sp>
         <p:nvSpPr>
-          <p:cNvPr id="10" name="TextBox 9"/>
+          <p:cNvPr id="11" name="TextBox 10"/>
           <p:cNvSpPr txBox="1"/>
           <p:nvPr/>
         </p:nvSpPr>
@@ -4846,7 +4966,7 @@
       </p:sp>
       <p:sp>
         <p:nvSpPr>
-          <p:cNvPr id="11" name="TextBox 10"/>
+          <p:cNvPr id="12" name="TextBox 11"/>
           <p:cNvSpPr txBox="1"/>
           <p:nvPr/>
         </p:nvSpPr>
@@ -4941,9 +5061,33 @@
           </a:p>
         </p:txBody>
       </p:sp>
-      <p:sp>
-        <p:nvSpPr>
-          <p:cNvPr id="3" name="TextBox 2"/>
+      <p:pic>
+        <p:nvPicPr>
+          <p:cNvPr id="3" name="Picture 2" descr="Логотип.png"/>
+          <p:cNvPicPr>
+            <a:picLocks noChangeAspect="1"/>
+          </p:cNvPicPr>
+          <p:nvPr/>
+        </p:nvPicPr>
+        <p:blipFill>
+          <a:blip r:embed="rId2"/>
+          <a:stretch>
+            <a:fillRect/>
+          </a:stretch>
+        </p:blipFill>
+        <p:spPr>
+          <a:xfrm>
+            <a:off x="10177272" y="182880"/>
+            <a:ext cx="685800" cy="685800"/>
+          </a:xfrm>
+          <a:prstGeom prst="rect">
+            <a:avLst/>
+          </a:prstGeom>
+        </p:spPr>
+      </p:pic>
+      <p:sp>
+        <p:nvSpPr>
+          <p:cNvPr id="4" name="TextBox 3"/>
           <p:cNvSpPr txBox="1"/>
           <p:nvPr/>
         </p:nvSpPr>
@@ -4979,7 +5123,7 @@
       </p:sp>
       <p:graphicFrame>
         <p:nvGraphicFramePr>
-          <p:cNvPr id="4" name="Table 3"/>
+          <p:cNvPr id="5" name="Table 4"/>
           <p:cNvGraphicFramePr>
             <a:graphicFrameLocks noGrp="1"/>
           </p:cNvGraphicFramePr>
@@ -5861,16 +6005,40 @@
           </a:p>
         </p:txBody>
       </p:sp>
-      <p:sp>
-        <p:nvSpPr>
-          <p:cNvPr id="3" name="TextBox 2"/>
+      <p:pic>
+        <p:nvPicPr>
+          <p:cNvPr id="3" name="Picture 2" descr="Логотип.png"/>
+          <p:cNvPicPr>
+            <a:picLocks noChangeAspect="1"/>
+          </p:cNvPicPr>
+          <p:nvPr/>
+        </p:nvPicPr>
+        <p:blipFill>
+          <a:blip r:embed="rId2"/>
+          <a:stretch>
+            <a:fillRect/>
+          </a:stretch>
+        </p:blipFill>
+        <p:spPr>
+          <a:xfrm>
+            <a:off x="10177272" y="182880"/>
+            <a:ext cx="685800" cy="685800"/>
+          </a:xfrm>
+          <a:prstGeom prst="rect">
+            <a:avLst/>
+          </a:prstGeom>
+        </p:spPr>
+      </p:pic>
+      <p:sp>
+        <p:nvSpPr>
+          <p:cNvPr id="4" name="TextBox 3"/>
           <p:cNvSpPr txBox="1"/>
           <p:nvPr/>
         </p:nvSpPr>
         <p:spPr>
           <a:xfrm>
-            <a:off x="540000" y="2743200"/>
-            <a:ext cx="11108952" cy="914400"/>
+            <a:off x="540000" y="457200"/>
+            <a:ext cx="11108952" cy="548640"/>
           </a:xfrm>
           <a:prstGeom prst="rect">
             <a:avLst/>
@@ -5892,7 +6060,697 @@
               </a:defRPr>
             </a:pPr>
             <a:r>
-              <a:t>Динамика ключевых метрик</a:t>
+              <a:t>Индивидуальные показатели</a:t>
+            </a:r>
+          </a:p>
+        </p:txBody>
+      </p:sp>
+      <p:sp>
+        <p:nvSpPr>
+          <p:cNvPr id="5" name="Rounded Rectangle 4"/>
+          <p:cNvSpPr/>
+          <p:nvPr/>
+        </p:nvSpPr>
+        <p:spPr>
+          <a:xfrm>
+            <a:off x="540000" y="1371600"/>
+            <a:ext cx="3566160" cy="1554480"/>
+          </a:xfrm>
+          <a:prstGeom prst="roundRect">
+            <a:avLst/>
+          </a:prstGeom>
+          <a:solidFill>
+            <a:srgbClr val="FF9800"/>
+          </a:solidFill>
+          <a:ln>
+            <a:noFill/>
+          </a:ln>
+        </p:spPr>
+        <p:style>
+          <a:lnRef idx="1">
+            <a:schemeClr val="accent1"/>
+          </a:lnRef>
+          <a:fillRef idx="3">
+            <a:schemeClr val="accent1"/>
+          </a:fillRef>
+          <a:effectRef idx="2">
+            <a:schemeClr val="accent1"/>
+          </a:effectRef>
+          <a:fontRef idx="minor">
+            <a:schemeClr val="lt1"/>
+          </a:fontRef>
+        </p:style>
+        <p:txBody>
+          <a:bodyPr rtlCol="0" anchor="ctr"/>
+          <a:lstStyle/>
+          <a:p>
+            <a:pPr algn="ctr"/>
+          </a:p>
+        </p:txBody>
+      </p:sp>
+      <p:sp>
+        <p:nvSpPr>
+          <p:cNvPr id="6" name="TextBox 5"/>
+          <p:cNvSpPr txBox="1"/>
+          <p:nvPr/>
+        </p:nvSpPr>
+        <p:spPr>
+          <a:xfrm>
+            <a:off x="722880" y="1554480"/>
+            <a:ext cx="3200400" cy="457200"/>
+          </a:xfrm>
+          <a:prstGeom prst="rect">
+            <a:avLst/>
+          </a:prstGeom>
+          <a:noFill/>
+        </p:spPr>
+        <p:txBody>
+          <a:bodyPr wrap="none">
+            <a:spAutoFit/>
+          </a:bodyPr>
+          <a:lstStyle/>
+          <a:p>
+            <a:pPr algn="ctr">
+              <a:defRPr sz="1400" b="1">
+                <a:solidFill>
+                  <a:srgbClr val="FFFFFF"/>
+                </a:solidFill>
+                <a:latin typeface="Roboto"/>
+              </a:defRPr>
+            </a:pPr>
+            <a:r>
+              <a:t>Бариев</a:t>
+            </a:r>
+          </a:p>
+        </p:txBody>
+      </p:sp>
+      <p:sp>
+        <p:nvSpPr>
+          <p:cNvPr id="7" name="TextBox 6"/>
+          <p:cNvSpPr txBox="1"/>
+          <p:nvPr/>
+        </p:nvSpPr>
+        <p:spPr>
+          <a:xfrm>
+            <a:off x="722880" y="2103120"/>
+            <a:ext cx="3200400" cy="640080"/>
+          </a:xfrm>
+          <a:prstGeom prst="rect">
+            <a:avLst/>
+          </a:prstGeom>
+          <a:noFill/>
+        </p:spPr>
+        <p:txBody>
+          <a:bodyPr wrap="none">
+            <a:spAutoFit/>
+          </a:bodyPr>
+          <a:lstStyle/>
+          <a:p>
+            <a:pPr algn="ctr">
+              <a:defRPr sz="1200">
+                <a:solidFill>
+                  <a:srgbClr val="FFFFFF"/>
+                </a:solidFill>
+                <a:latin typeface="Roboto"/>
+              </a:defRPr>
+            </a:pPr>
+            <a:r>
+              <a:t>📞 10 • 📝 1 • 💰 100,0</a:t>
+            </a:r>
+          </a:p>
+        </p:txBody>
+      </p:sp>
+      <p:sp>
+        <p:nvSpPr>
+          <p:cNvPr id="8" name="Rounded Rectangle 7"/>
+          <p:cNvSpPr/>
+          <p:nvPr/>
+        </p:nvSpPr>
+        <p:spPr>
+          <a:xfrm>
+            <a:off x="4380480" y="1371600"/>
+            <a:ext cx="3566160" cy="1554480"/>
+          </a:xfrm>
+          <a:prstGeom prst="roundRect">
+            <a:avLst/>
+          </a:prstGeom>
+          <a:solidFill>
+            <a:srgbClr val="C62828"/>
+          </a:solidFill>
+          <a:ln>
+            <a:noFill/>
+          </a:ln>
+        </p:spPr>
+        <p:style>
+          <a:lnRef idx="1">
+            <a:schemeClr val="accent1"/>
+          </a:lnRef>
+          <a:fillRef idx="3">
+            <a:schemeClr val="accent1"/>
+          </a:fillRef>
+          <a:effectRef idx="2">
+            <a:schemeClr val="accent1"/>
+          </a:effectRef>
+          <a:fontRef idx="minor">
+            <a:schemeClr val="lt1"/>
+          </a:fontRef>
+        </p:style>
+        <p:txBody>
+          <a:bodyPr rtlCol="0" anchor="ctr"/>
+          <a:lstStyle/>
+          <a:p>
+            <a:pPr algn="ctr"/>
+          </a:p>
+        </p:txBody>
+      </p:sp>
+      <p:sp>
+        <p:nvSpPr>
+          <p:cNvPr id="9" name="TextBox 8"/>
+          <p:cNvSpPr txBox="1"/>
+          <p:nvPr/>
+        </p:nvSpPr>
+        <p:spPr>
+          <a:xfrm>
+            <a:off x="4563360" y="1554480"/>
+            <a:ext cx="3200400" cy="457200"/>
+          </a:xfrm>
+          <a:prstGeom prst="rect">
+            <a:avLst/>
+          </a:prstGeom>
+          <a:noFill/>
+        </p:spPr>
+        <p:txBody>
+          <a:bodyPr wrap="none">
+            <a:spAutoFit/>
+          </a:bodyPr>
+          <a:lstStyle/>
+          <a:p>
+            <a:pPr algn="ctr">
+              <a:defRPr sz="1400" b="1">
+                <a:solidFill>
+                  <a:srgbClr val="FFFFFF"/>
+                </a:solidFill>
+                <a:latin typeface="Roboto"/>
+              </a:defRPr>
+            </a:pPr>
+            <a:r>
+              <a:t>Воробьев</a:t>
+            </a:r>
+          </a:p>
+        </p:txBody>
+      </p:sp>
+      <p:sp>
+        <p:nvSpPr>
+          <p:cNvPr id="10" name="TextBox 9"/>
+          <p:cNvSpPr txBox="1"/>
+          <p:nvPr/>
+        </p:nvSpPr>
+        <p:spPr>
+          <a:xfrm>
+            <a:off x="4563360" y="2103120"/>
+            <a:ext cx="3200400" cy="640080"/>
+          </a:xfrm>
+          <a:prstGeom prst="rect">
+            <a:avLst/>
+          </a:prstGeom>
+          <a:noFill/>
+        </p:spPr>
+        <p:txBody>
+          <a:bodyPr wrap="none">
+            <a:spAutoFit/>
+          </a:bodyPr>
+          <a:lstStyle/>
+          <a:p>
+            <a:pPr algn="ctr">
+              <a:defRPr sz="1200">
+                <a:solidFill>
+                  <a:srgbClr val="FFFFFF"/>
+                </a:solidFill>
+                <a:latin typeface="Roboto"/>
+              </a:defRPr>
+            </a:pPr>
+            <a:r>
+              <a:t>📞 23 • 📝 3 • 💰 200,0</a:t>
+            </a:r>
+          </a:p>
+        </p:txBody>
+      </p:sp>
+      <p:sp>
+        <p:nvSpPr>
+          <p:cNvPr id="11" name="Rounded Rectangle 10"/>
+          <p:cNvSpPr/>
+          <p:nvPr/>
+        </p:nvSpPr>
+        <p:spPr>
+          <a:xfrm>
+            <a:off x="8220960" y="1371600"/>
+            <a:ext cx="3566160" cy="1554480"/>
+          </a:xfrm>
+          <a:prstGeom prst="roundRect">
+            <a:avLst/>
+          </a:prstGeom>
+          <a:solidFill>
+            <a:srgbClr val="C62828"/>
+          </a:solidFill>
+          <a:ln>
+            <a:noFill/>
+          </a:ln>
+        </p:spPr>
+        <p:style>
+          <a:lnRef idx="1">
+            <a:schemeClr val="accent1"/>
+          </a:lnRef>
+          <a:fillRef idx="3">
+            <a:schemeClr val="accent1"/>
+          </a:fillRef>
+          <a:effectRef idx="2">
+            <a:schemeClr val="accent1"/>
+          </a:effectRef>
+          <a:fontRef idx="minor">
+            <a:schemeClr val="lt1"/>
+          </a:fontRef>
+        </p:style>
+        <p:txBody>
+          <a:bodyPr rtlCol="0" anchor="ctr"/>
+          <a:lstStyle/>
+          <a:p>
+            <a:pPr algn="ctr"/>
+          </a:p>
+        </p:txBody>
+      </p:sp>
+      <p:sp>
+        <p:nvSpPr>
+          <p:cNvPr id="12" name="TextBox 11"/>
+          <p:cNvSpPr txBox="1"/>
+          <p:nvPr/>
+        </p:nvSpPr>
+        <p:spPr>
+          <a:xfrm>
+            <a:off x="8403840" y="1554480"/>
+            <a:ext cx="3200400" cy="457200"/>
+          </a:xfrm>
+          <a:prstGeom prst="rect">
+            <a:avLst/>
+          </a:prstGeom>
+          <a:noFill/>
+        </p:spPr>
+        <p:txBody>
+          <a:bodyPr wrap="none">
+            <a:spAutoFit/>
+          </a:bodyPr>
+          <a:lstStyle/>
+          <a:p>
+            <a:pPr algn="ctr">
+              <a:defRPr sz="1400" b="1">
+                <a:solidFill>
+                  <a:srgbClr val="FFFFFF"/>
+                </a:solidFill>
+                <a:latin typeface="Roboto"/>
+              </a:defRPr>
+            </a:pPr>
+            <a:r>
+              <a:t>Шевченко</a:t>
+            </a:r>
+          </a:p>
+        </p:txBody>
+      </p:sp>
+      <p:sp>
+        <p:nvSpPr>
+          <p:cNvPr id="13" name="TextBox 12"/>
+          <p:cNvSpPr txBox="1"/>
+          <p:nvPr/>
+        </p:nvSpPr>
+        <p:spPr>
+          <a:xfrm>
+            <a:off x="8403840" y="2103120"/>
+            <a:ext cx="3200400" cy="640080"/>
+          </a:xfrm>
+          <a:prstGeom prst="rect">
+            <a:avLst/>
+          </a:prstGeom>
+          <a:noFill/>
+        </p:spPr>
+        <p:txBody>
+          <a:bodyPr wrap="none">
+            <a:spAutoFit/>
+          </a:bodyPr>
+          <a:lstStyle/>
+          <a:p>
+            <a:pPr algn="ctr">
+              <a:defRPr sz="1200">
+                <a:solidFill>
+                  <a:srgbClr val="FFFFFF"/>
+                </a:solidFill>
+                <a:latin typeface="Roboto"/>
+              </a:defRPr>
+            </a:pPr>
+            <a:r>
+              <a:t>📞 8 • 📝 4 • 💰 117,0</a:t>
+            </a:r>
+          </a:p>
+        </p:txBody>
+      </p:sp>
+      <p:sp>
+        <p:nvSpPr>
+          <p:cNvPr id="14" name="Rounded Rectangle 13"/>
+          <p:cNvSpPr/>
+          <p:nvPr/>
+        </p:nvSpPr>
+        <p:spPr>
+          <a:xfrm>
+            <a:off x="540000" y="3108960"/>
+            <a:ext cx="3566160" cy="1554480"/>
+          </a:xfrm>
+          <a:prstGeom prst="roundRect">
+            <a:avLst/>
+          </a:prstGeom>
+          <a:solidFill>
+            <a:srgbClr val="2E7D32"/>
+          </a:solidFill>
+          <a:ln>
+            <a:noFill/>
+          </a:ln>
+        </p:spPr>
+        <p:style>
+          <a:lnRef idx="1">
+            <a:schemeClr val="accent1"/>
+          </a:lnRef>
+          <a:fillRef idx="3">
+            <a:schemeClr val="accent1"/>
+          </a:fillRef>
+          <a:effectRef idx="2">
+            <a:schemeClr val="accent1"/>
+          </a:effectRef>
+          <a:fontRef idx="minor">
+            <a:schemeClr val="lt1"/>
+          </a:fontRef>
+        </p:style>
+        <p:txBody>
+          <a:bodyPr rtlCol="0" anchor="ctr"/>
+          <a:lstStyle/>
+          <a:p>
+            <a:pPr algn="ctr"/>
+          </a:p>
+        </p:txBody>
+      </p:sp>
+      <p:sp>
+        <p:nvSpPr>
+          <p:cNvPr id="15" name="TextBox 14"/>
+          <p:cNvSpPr txBox="1"/>
+          <p:nvPr/>
+        </p:nvSpPr>
+        <p:spPr>
+          <a:xfrm>
+            <a:off x="722880" y="3291840"/>
+            <a:ext cx="3200400" cy="457200"/>
+          </a:xfrm>
+          <a:prstGeom prst="rect">
+            <a:avLst/>
+          </a:prstGeom>
+          <a:noFill/>
+        </p:spPr>
+        <p:txBody>
+          <a:bodyPr wrap="none">
+            <a:spAutoFit/>
+          </a:bodyPr>
+          <a:lstStyle/>
+          <a:p>
+            <a:pPr algn="ctr">
+              <a:defRPr sz="1400" b="1">
+                <a:solidFill>
+                  <a:srgbClr val="FFFFFF"/>
+                </a:solidFill>
+                <a:latin typeface="Roboto"/>
+              </a:defRPr>
+            </a:pPr>
+            <a:r>
+              <a:t>Туробов</a:t>
+            </a:r>
+          </a:p>
+        </p:txBody>
+      </p:sp>
+      <p:sp>
+        <p:nvSpPr>
+          <p:cNvPr id="16" name="TextBox 15"/>
+          <p:cNvSpPr txBox="1"/>
+          <p:nvPr/>
+        </p:nvSpPr>
+        <p:spPr>
+          <a:xfrm>
+            <a:off x="722880" y="3840480"/>
+            <a:ext cx="3200400" cy="640080"/>
+          </a:xfrm>
+          <a:prstGeom prst="rect">
+            <a:avLst/>
+          </a:prstGeom>
+          <a:noFill/>
+        </p:spPr>
+        <p:txBody>
+          <a:bodyPr wrap="none">
+            <a:spAutoFit/>
+          </a:bodyPr>
+          <a:lstStyle/>
+          <a:p>
+            <a:pPr algn="ctr">
+              <a:defRPr sz="1200">
+                <a:solidFill>
+                  <a:srgbClr val="FFFFFF"/>
+                </a:solidFill>
+                <a:latin typeface="Roboto"/>
+              </a:defRPr>
+            </a:pPr>
+            <a:r>
+              <a:t>📞 5 • 📝 5 • 💰 212,0</a:t>
+            </a:r>
+          </a:p>
+        </p:txBody>
+      </p:sp>
+      <p:sp>
+        <p:nvSpPr>
+          <p:cNvPr id="17" name="Rounded Rectangle 16"/>
+          <p:cNvSpPr/>
+          <p:nvPr/>
+        </p:nvSpPr>
+        <p:spPr>
+          <a:xfrm>
+            <a:off x="4380480" y="3108960"/>
+            <a:ext cx="3566160" cy="1554480"/>
+          </a:xfrm>
+          <a:prstGeom prst="roundRect">
+            <a:avLst/>
+          </a:prstGeom>
+          <a:solidFill>
+            <a:srgbClr val="C62828"/>
+          </a:solidFill>
+          <a:ln>
+            <a:noFill/>
+          </a:ln>
+        </p:spPr>
+        <p:style>
+          <a:lnRef idx="1">
+            <a:schemeClr val="accent1"/>
+          </a:lnRef>
+          <a:fillRef idx="3">
+            <a:schemeClr val="accent1"/>
+          </a:fillRef>
+          <a:effectRef idx="2">
+            <a:schemeClr val="accent1"/>
+          </a:effectRef>
+          <a:fontRef idx="minor">
+            <a:schemeClr val="lt1"/>
+          </a:fontRef>
+        </p:style>
+        <p:txBody>
+          <a:bodyPr rtlCol="0" anchor="ctr"/>
+          <a:lstStyle/>
+          <a:p>
+            <a:pPr algn="ctr"/>
+          </a:p>
+        </p:txBody>
+      </p:sp>
+      <p:sp>
+        <p:nvSpPr>
+          <p:cNvPr id="18" name="TextBox 17"/>
+          <p:cNvSpPr txBox="1"/>
+          <p:nvPr/>
+        </p:nvSpPr>
+        <p:spPr>
+          <a:xfrm>
+            <a:off x="4563360" y="3291840"/>
+            <a:ext cx="3200400" cy="457200"/>
+          </a:xfrm>
+          <a:prstGeom prst="rect">
+            <a:avLst/>
+          </a:prstGeom>
+          <a:noFill/>
+        </p:spPr>
+        <p:txBody>
+          <a:bodyPr wrap="none">
+            <a:spAutoFit/>
+          </a:bodyPr>
+          <a:lstStyle/>
+          <a:p>
+            <a:pPr algn="ctr">
+              <a:defRPr sz="1400" b="1">
+                <a:solidFill>
+                  <a:srgbClr val="FFFFFF"/>
+                </a:solidFill>
+                <a:latin typeface="Roboto"/>
+              </a:defRPr>
+            </a:pPr>
+            <a:r>
+              <a:t>Романченко</a:t>
+            </a:r>
+          </a:p>
+        </p:txBody>
+      </p:sp>
+      <p:sp>
+        <p:nvSpPr>
+          <p:cNvPr id="19" name="TextBox 18"/>
+          <p:cNvSpPr txBox="1"/>
+          <p:nvPr/>
+        </p:nvSpPr>
+        <p:spPr>
+          <a:xfrm>
+            <a:off x="4563360" y="3840480"/>
+            <a:ext cx="3200400" cy="640080"/>
+          </a:xfrm>
+          <a:prstGeom prst="rect">
+            <a:avLst/>
+          </a:prstGeom>
+          <a:noFill/>
+        </p:spPr>
+        <p:txBody>
+          <a:bodyPr wrap="none">
+            <a:spAutoFit/>
+          </a:bodyPr>
+          <a:lstStyle/>
+          <a:p>
+            <a:pPr algn="ctr">
+              <a:defRPr sz="1200">
+                <a:solidFill>
+                  <a:srgbClr val="FFFFFF"/>
+                </a:solidFill>
+                <a:latin typeface="Roboto"/>
+              </a:defRPr>
+            </a:pPr>
+            <a:r>
+              <a:t>📞 55 • 📝 2 • 💰 7,0</a:t>
+            </a:r>
+          </a:p>
+        </p:txBody>
+      </p:sp>
+      <p:sp>
+        <p:nvSpPr>
+          <p:cNvPr id="20" name="Rounded Rectangle 19"/>
+          <p:cNvSpPr/>
+          <p:nvPr/>
+        </p:nvSpPr>
+        <p:spPr>
+          <a:xfrm>
+            <a:off x="8220960" y="3108960"/>
+            <a:ext cx="3566160" cy="1554480"/>
+          </a:xfrm>
+          <a:prstGeom prst="roundRect">
+            <a:avLst/>
+          </a:prstGeom>
+          <a:solidFill>
+            <a:srgbClr val="C62828"/>
+          </a:solidFill>
+          <a:ln>
+            <a:noFill/>
+          </a:ln>
+        </p:spPr>
+        <p:style>
+          <a:lnRef idx="1">
+            <a:schemeClr val="accent1"/>
+          </a:lnRef>
+          <a:fillRef idx="3">
+            <a:schemeClr val="accent1"/>
+          </a:fillRef>
+          <a:effectRef idx="2">
+            <a:schemeClr val="accent1"/>
+          </a:effectRef>
+          <a:fontRef idx="minor">
+            <a:schemeClr val="lt1"/>
+          </a:fontRef>
+        </p:style>
+        <p:txBody>
+          <a:bodyPr rtlCol="0" anchor="ctr"/>
+          <a:lstStyle/>
+          <a:p>
+            <a:pPr algn="ctr"/>
+          </a:p>
+        </p:txBody>
+      </p:sp>
+      <p:sp>
+        <p:nvSpPr>
+          <p:cNvPr id="21" name="TextBox 20"/>
+          <p:cNvSpPr txBox="1"/>
+          <p:nvPr/>
+        </p:nvSpPr>
+        <p:spPr>
+          <a:xfrm>
+            <a:off x="8403840" y="3291840"/>
+            <a:ext cx="3200400" cy="457200"/>
+          </a:xfrm>
+          <a:prstGeom prst="rect">
+            <a:avLst/>
+          </a:prstGeom>
+          <a:noFill/>
+        </p:spPr>
+        <p:txBody>
+          <a:bodyPr wrap="none">
+            <a:spAutoFit/>
+          </a:bodyPr>
+          <a:lstStyle/>
+          <a:p>
+            <a:pPr algn="ctr">
+              <a:defRPr sz="1400" b="1">
+                <a:solidFill>
+                  <a:srgbClr val="FFFFFF"/>
+                </a:solidFill>
+                <a:latin typeface="Roboto"/>
+              </a:defRPr>
+            </a:pPr>
+            <a:r>
+              <a:t>тест</a:t>
+            </a:r>
+          </a:p>
+        </p:txBody>
+      </p:sp>
+      <p:sp>
+        <p:nvSpPr>
+          <p:cNvPr id="22" name="TextBox 21"/>
+          <p:cNvSpPr txBox="1"/>
+          <p:nvPr/>
+        </p:nvSpPr>
+        <p:spPr>
+          <a:xfrm>
+            <a:off x="8403840" y="3840480"/>
+            <a:ext cx="3200400" cy="640080"/>
+          </a:xfrm>
+          <a:prstGeom prst="rect">
+            <a:avLst/>
+          </a:prstGeom>
+          <a:noFill/>
+        </p:spPr>
+        <p:txBody>
+          <a:bodyPr wrap="none">
+            <a:spAutoFit/>
+          </a:bodyPr>
+          <a:lstStyle/>
+          <a:p>
+            <a:pPr algn="ctr">
+              <a:defRPr sz="1200">
+                <a:solidFill>
+                  <a:srgbClr val="FFFFFF"/>
+                </a:solidFill>
+                <a:latin typeface="Roboto"/>
+              </a:defRPr>
+            </a:pPr>
+            <a:r>
+              <a:t>📞 10 • 📝 3 • 💰 10,0</a:t>
             </a:r>
           </a:p>
         </p:txBody>
@@ -5958,16 +6816,40 @@
           </a:p>
         </p:txBody>
       </p:sp>
-      <p:sp>
-        <p:nvSpPr>
-          <p:cNvPr id="3" name="TextBox 2"/>
+      <p:pic>
+        <p:nvPicPr>
+          <p:cNvPr id="3" name="Picture 2" descr="Логотип.png"/>
+          <p:cNvPicPr>
+            <a:picLocks noChangeAspect="1"/>
+          </p:cNvPicPr>
+          <p:nvPr/>
+        </p:nvPicPr>
+        <p:blipFill>
+          <a:blip r:embed="rId2"/>
+          <a:stretch>
+            <a:fillRect/>
+          </a:stretch>
+        </p:blipFill>
+        <p:spPr>
+          <a:xfrm>
+            <a:off x="10177272" y="182880"/>
+            <a:ext cx="685800" cy="685800"/>
+          </a:xfrm>
+          <a:prstGeom prst="rect">
+            <a:avLst/>
+          </a:prstGeom>
+        </p:spPr>
+      </p:pic>
+      <p:sp>
+        <p:nvSpPr>
+          <p:cNvPr id="4" name="TextBox 3"/>
           <p:cNvSpPr txBox="1"/>
           <p:nvPr/>
         </p:nvSpPr>
         <p:spPr>
           <a:xfrm>
-            <a:off x="540000" y="2743200"/>
-            <a:ext cx="11108952" cy="914400"/>
+            <a:off x="540000" y="457200"/>
+            <a:ext cx="11108952" cy="548640"/>
           </a:xfrm>
           <a:prstGeom prst="rect">
             <a:avLst/>
@@ -5989,11 +6871,35 @@
               </a:defRPr>
             </a:pPr>
             <a:r>
-              <a:t>Индивидуальные показатели</a:t>
-            </a:r>
-          </a:p>
-        </p:txBody>
-      </p:sp>
+              <a:t>Динамика ключевых метрик</a:t>
+            </a:r>
+          </a:p>
+        </p:txBody>
+      </p:sp>
+      <p:pic>
+        <p:nvPicPr>
+          <p:cNvPr id="5" name="Picture 4" descr="dynamics_line.png"/>
+          <p:cNvPicPr>
+            <a:picLocks noChangeAspect="1"/>
+          </p:cNvPicPr>
+          <p:nvPr/>
+        </p:nvPicPr>
+        <p:blipFill>
+          <a:blip r:embed="rId3"/>
+          <a:stretch>
+            <a:fillRect/>
+          </a:stretch>
+        </p:blipFill>
+        <p:spPr>
+          <a:xfrm>
+            <a:off x="1828800" y="1371600"/>
+            <a:ext cx="8229600" cy="4572000"/>
+          </a:xfrm>
+          <a:prstGeom prst="rect">
+            <a:avLst/>
+          </a:prstGeom>
+        </p:spPr>
+      </p:pic>
     </p:spTree>
   </p:cSld>
   <p:clrMapOvr>
@@ -6055,16 +6961,40 @@
           </a:p>
         </p:txBody>
       </p:sp>
-      <p:sp>
-        <p:nvSpPr>
-          <p:cNvPr id="3" name="TextBox 2"/>
+      <p:pic>
+        <p:nvPicPr>
+          <p:cNvPr id="3" name="Picture 2" descr="Логотип.png"/>
+          <p:cNvPicPr>
+            <a:picLocks noChangeAspect="1"/>
+          </p:cNvPicPr>
+          <p:nvPr/>
+        </p:nvPicPr>
+        <p:blipFill>
+          <a:blip r:embed="rId2"/>
+          <a:stretch>
+            <a:fillRect/>
+          </a:stretch>
+        </p:blipFill>
+        <p:spPr>
+          <a:xfrm>
+            <a:off x="10177272" y="182880"/>
+            <a:ext cx="685800" cy="685800"/>
+          </a:xfrm>
+          <a:prstGeom prst="rect">
+            <a:avLst/>
+          </a:prstGeom>
+        </p:spPr>
+      </p:pic>
+      <p:sp>
+        <p:nvSpPr>
+          <p:cNvPr id="4" name="TextBox 3"/>
           <p:cNvSpPr txBox="1"/>
           <p:nvPr/>
         </p:nvSpPr>
         <p:spPr>
           <a:xfrm>
-            <a:off x="540000" y="2743200"/>
-            <a:ext cx="11108952" cy="914400"/>
+            <a:off x="540000" y="457200"/>
+            <a:ext cx="11108952" cy="548640"/>
           </a:xfrm>
           <a:prstGeom prst="rect">
             <a:avLst/>
@@ -6086,7 +7016,258 @@
               </a:defRPr>
             </a:pPr>
             <a:r>
-              <a:t>Выводы и следующие шаги</a:t>
+              <a:t>Выводы и рекомендации</a:t>
+            </a:r>
+          </a:p>
+        </p:txBody>
+      </p:sp>
+      <p:sp>
+        <p:nvSpPr>
+          <p:cNvPr id="5" name="TextBox 4"/>
+          <p:cNvSpPr txBox="1"/>
+          <p:nvPr/>
+        </p:nvSpPr>
+        <p:spPr>
+          <a:xfrm>
+            <a:off x="540000" y="1371600"/>
+            <a:ext cx="11108952" cy="4572000"/>
+          </a:xfrm>
+          <a:prstGeom prst="rect">
+            <a:avLst/>
+          </a:prstGeom>
+          <a:noFill/>
+        </p:spPr>
+        <p:txBody>
+          <a:bodyPr wrap="square">
+            <a:spAutoFit/>
+          </a:bodyPr>
+          <a:lstStyle/>
+          <a:p>
+            <a:pPr>
+              <a:lnSpc>
+                <a:spcPct val="130000"/>
+              </a:lnSpc>
+              <a:defRPr sz="1600">
+                <a:solidFill>
+                  <a:srgbClr val="222222"/>
+                </a:solidFill>
+                <a:latin typeface="Roboto"/>
+              </a:defRPr>
+            </a:pPr>
+            <a:r>
+              <a:t>🎯 КЛЮЧЕВЫЕ ВЫВОДЫ:</a:t>
+            </a:r>
+          </a:p>
+          <a:p>
+            <a:pPr>
+              <a:lnSpc>
+                <a:spcPct val="130000"/>
+              </a:lnSpc>
+              <a:defRPr sz="1600">
+                <a:solidFill>
+                  <a:srgbClr val="222222"/>
+                </a:solidFill>
+                <a:latin typeface="Roboto"/>
+              </a:defRPr>
+            </a:pPr>
+          </a:p>
+          <a:p>
+            <a:pPr>
+              <a:lnSpc>
+                <a:spcPct val="130000"/>
+              </a:lnSpc>
+              <a:defRPr sz="1600">
+                <a:solidFill>
+                  <a:srgbClr val="222222"/>
+                </a:solidFill>
+                <a:latin typeface="Roboto"/>
+              </a:defRPr>
+            </a:pPr>
+            <a:r>
+              <a:t>За период с 01.09.2025 по 07.09.2025 количество перезвонить составило 111 из 164 (67,7%), что свидетельствует о снижении активности по сравнению с запланированным количеством звонков. Количество заявок превысило запланированное (18 из 16, 112,5%), однако сумма заявок значительно выше ожидаемой (646,0 из 204,0, 316,7%). Одобрено гарантий на сумму 186 млн, выдано — на 39 млн.</a:t>
+            </a:r>
+          </a:p>
+          <a:p>
+            <a:pPr>
+              <a:lnSpc>
+                <a:spcPct val="130000"/>
+              </a:lnSpc>
+              <a:defRPr sz="1600">
+                <a:solidFill>
+                  <a:srgbClr val="222222"/>
+                </a:solidFill>
+                <a:latin typeface="Roboto"/>
+              </a:defRPr>
+            </a:pPr>
+          </a:p>
+          <a:p>
+            <a:pPr>
+              <a:lnSpc>
+                <a:spcPct val="130000"/>
+              </a:lnSpc>
+              <a:defRPr sz="1600">
+                <a:solidFill>
+                  <a:srgbClr val="222222"/>
+                </a:solidFill>
+                <a:latin typeface="Roboto"/>
+              </a:defRPr>
+            </a:pPr>
+            <a:r>
+              <a:t>Узкое место: низкая конверсия звонков в заявки.</a:t>
+            </a:r>
+          </a:p>
+          <a:p>
+            <a:pPr>
+              <a:lnSpc>
+                <a:spcPct val="130000"/>
+              </a:lnSpc>
+              <a:defRPr sz="1600">
+                <a:solidFill>
+                  <a:srgbClr val="222222"/>
+                </a:solidFill>
+                <a:latin typeface="Roboto"/>
+              </a:defRPr>
+            </a:pPr>
+          </a:p>
+          <a:p>
+            <a:pPr>
+              <a:lnSpc>
+                <a:spcPct val="130000"/>
+              </a:lnSpc>
+              <a:defRPr sz="1600">
+                <a:solidFill>
+                  <a:srgbClr val="222222"/>
+                </a:solidFill>
+                <a:latin typeface="Roboto"/>
+              </a:defRPr>
+            </a:pPr>
+            <a:r>
+              <a:t>На неделю:</a:t>
+            </a:r>
+          </a:p>
+          <a:p>
+            <a:pPr>
+              <a:lnSpc>
+                <a:spcPct val="130000"/>
+              </a:lnSpc>
+              <a:defRPr sz="1600">
+                <a:solidFill>
+                  <a:srgbClr val="222222"/>
+                </a:solidFill>
+                <a:latin typeface="Roboto"/>
+              </a:defRPr>
+            </a:pPr>
+            <a:r>
+              <a:t>1. Проанализировать причины низкой конверсии звонков.</a:t>
+            </a:r>
+          </a:p>
+          <a:p>
+            <a:pPr>
+              <a:lnSpc>
+                <a:spcPct val="130000"/>
+              </a:lnSpc>
+              <a:defRPr sz="1600">
+                <a:solidFill>
+                  <a:srgbClr val="222222"/>
+                </a:solidFill>
+                <a:latin typeface="Roboto"/>
+              </a:defRPr>
+            </a:pPr>
+            <a:r>
+              <a:t>2. Оптимизировать процесс обработки заявок для повышения их количества и качества.</a:t>
+            </a:r>
+          </a:p>
+          <a:p>
+            <a:pPr>
+              <a:lnSpc>
+                <a:spcPct val="130000"/>
+              </a:lnSpc>
+              <a:defRPr sz="1600">
+                <a:solidFill>
+                  <a:srgbClr val="222222"/>
+                </a:solidFill>
+                <a:latin typeface="Roboto"/>
+              </a:defRPr>
+            </a:pPr>
+            <a:r>
+              <a:t>3. Провести встречу с отделом продаж для обсуждения стратегии увеличения количества звонков и улучшения качества взаимодействия с клиентами.</a:t>
+            </a:r>
+          </a:p>
+          <a:p>
+            <a:pPr>
+              <a:lnSpc>
+                <a:spcPct val="130000"/>
+              </a:lnSpc>
+              <a:defRPr sz="1600">
+                <a:solidFill>
+                  <a:srgbClr val="222222"/>
+                </a:solidFill>
+                <a:latin typeface="Roboto"/>
+              </a:defRPr>
+            </a:pPr>
+          </a:p>
+          <a:p>
+            <a:pPr>
+              <a:lnSpc>
+                <a:spcPct val="130000"/>
+              </a:lnSpc>
+              <a:defRPr sz="1600">
+                <a:solidFill>
+                  <a:srgbClr val="222222"/>
+                </a:solidFill>
+                <a:latin typeface="Roboto"/>
+              </a:defRPr>
+            </a:pPr>
+            <a:r>
+              <a:t>📌 СЛЕДУЮЩИЕ ШАГИ:</a:t>
+            </a:r>
+          </a:p>
+          <a:p>
+            <a:pPr>
+              <a:lnSpc>
+                <a:spcPct val="130000"/>
+              </a:lnSpc>
+              <a:defRPr sz="1600">
+                <a:solidFill>
+                  <a:srgbClr val="222222"/>
+                </a:solidFill>
+                <a:latin typeface="Roboto"/>
+              </a:defRPr>
+            </a:pPr>
+            <a:r>
+              <a:t>• Усилить работу с отстающими</a:t>
+            </a:r>
+          </a:p>
+          <a:p>
+            <a:pPr>
+              <a:lnSpc>
+                <a:spcPct val="130000"/>
+              </a:lnSpc>
+              <a:defRPr sz="1600">
+                <a:solidFill>
+                  <a:srgbClr val="222222"/>
+                </a:solidFill>
+                <a:latin typeface="Roboto"/>
+              </a:defRPr>
+            </a:pPr>
+            <a:r>
+              <a:t>• Масштабировать успешные практики</a:t>
+            </a:r>
+          </a:p>
+          <a:p>
+            <a:pPr>
+              <a:lnSpc>
+                <a:spcPct val="130000"/>
+              </a:lnSpc>
+              <a:defRPr sz="1600">
+                <a:solidFill>
+                  <a:srgbClr val="222222"/>
+                </a:solidFill>
+                <a:latin typeface="Roboto"/>
+              </a:defRPr>
+            </a:pPr>
+            <a:r>
+              <a:t>• Оптимизировать процессы</a:t>
             </a:r>
           </a:p>
         </p:txBody>

</xml_diff>

<commit_message>
feat: Add reference gradients and fix logo on all slides
</commit_message>
<xml_diff>
--- a/brief_compliant_20250901_20250907.pptx
+++ b/brief_compliant_20250901_20250907.pptx
@@ -3339,9 +3339,17 @@
           <a:prstGeom prst="rect">
             <a:avLst/>
           </a:prstGeom>
-          <a:solidFill>
-            <a:srgbClr val="FFFFFF"/>
-          </a:solidFill>
+          <a:gradFill rotWithShape="1">
+            <a:gsLst>
+              <a:gs pos="0">
+                <a:srgbClr val="F8F9FA"/>
+              </a:gs>
+              <a:gs pos="100000">
+                <a:srgbClr val="E8F5E8"/>
+              </a:gs>
+            </a:gsLst>
+            <a:lin scaled="0"/>
+          </a:gradFill>
           <a:ln>
             <a:noFill/>
           </a:ln>
@@ -4273,7 +4281,7 @@
               </a:defRPr>
             </a:pPr>
             <a:r>
-              <a:t>За период 01.09.2025—07.09.2025 количество перезвонить по заявкам составило 111 из 164 (67,7%), что является хорошим показателем. Однако количество обработанных заявок превысило плановое (18 из 16, 112,5%) и объём заявок в миллионах также значительно превысил план (646,0 из 204,0, 316,7%). Это может свидетельствовать о высоком спросе на банковские гарантии.</a:t>
+              <a:t>За период 01.09.2025—07.09.2025 количество перезвонить по заявкам составило 111 из 164 (67,7%), что свидетельствует о высокой конверсии. Количество обработанных заявок превысило плановое на 12,5% (18 из 16). Однако объём одобренных гарантий (186 млн) значительно превышает выданный (39 млн).</a:t>
             </a:r>
           </a:p>
           <a:p>
@@ -4302,7 +4310,7 @@
               </a:defRPr>
             </a:pPr>
             <a:r>
-              <a:t>Узкое место — необходимо оптимизировать процесс обработки заявок для более точного планирования и выполнения плановых показателей.</a:t>
+              <a:t>Узкое место: низкий процент выдачи гарантий по отношению к одобренным.</a:t>
             </a:r>
           </a:p>
           <a:p>
@@ -4347,7 +4355,7 @@
               </a:defRPr>
             </a:pPr>
             <a:r>
-              <a:t>1. Провести анализ причин превышения плановых показателей по заявкам.</a:t>
+              <a:t>1. Проанализировать причины низкой выдачи по одобренным заявкам.</a:t>
             </a:r>
           </a:p>
           <a:p>
@@ -4363,7 +4371,7 @@
               </a:defRPr>
             </a:pPr>
             <a:r>
-              <a:t>2. Скорректировать план обработки заявок с учётом текущей динамики.</a:t>
+              <a:t>2. Оптимизировать процесс выдачи гарантий для сокращения разрыва между одобрением и выдачей.</a:t>
             </a:r>
           </a:p>
           <a:p>
@@ -4379,7 +4387,7 @@
               </a:defRPr>
             </a:pPr>
             <a:r>
-              <a:t>3. Организовать совещание с отделом для обсуждения оптимизации процессов.</a:t>
+              <a:t>3. Провести встречу с отделом обработки заявок для обсуждения текущих проблем и выработки решений.</a:t>
             </a:r>
           </a:p>
         </p:txBody>
@@ -7084,7 +7092,7 @@
               </a:defRPr>
             </a:pPr>
             <a:r>
-              <a:t>За период с 01.09.2025 по 07.09.2025 количество перезвонить составило 111 из 164 (67,7%), что свидетельствует о снижении активности по сравнению с запланированным количеством звонков. Количество заявок превысило запланированное (18 из 16, 112,5%), однако сумма заявок значительно выше ожидаемой (646,0 из 204,0, 316,7%). Одобрено гарантий на сумму 186 млн, выдано — на 39 млн.</a:t>
+              <a:t>За период с 01.09.2025 по 07.09.2025 количество перезвонить по заявкам составило 111 из 164 (67,7%), что является положительным результатом. Однако количество обработанных заявок превысило плановое (18 из 16, 112,5%) и сумма заявок значительно выше ожидаемой (646,0 из 204,0, 316,7%).</a:t>
             </a:r>
           </a:p>
           <a:p>
@@ -7113,7 +7121,7 @@
               </a:defRPr>
             </a:pPr>
             <a:r>
-              <a:t>Узкое место: низкая конверсия звонков в заявки.</a:t>
+              <a:t>Узкое место: необходимо оптимизировать процесс обработки заявок для соответствия плановым показателям.</a:t>
             </a:r>
           </a:p>
           <a:p>
@@ -7158,7 +7166,7 @@
               </a:defRPr>
             </a:pPr>
             <a:r>
-              <a:t>1. Проанализировать причины низкой конверсии звонков.</a:t>
+              <a:t>1. Проанализировать причины превышения плановых показателей по заявкам.</a:t>
             </a:r>
           </a:p>
           <a:p>
@@ -7174,7 +7182,7 @@
               </a:defRPr>
             </a:pPr>
             <a:r>
-              <a:t>2. Оптимизировать процесс обработки заявок для повышения их количества и качества.</a:t>
+              <a:t>2. Скорректировать процессы обработки заявок для достижения плановых показателей.</a:t>
             </a:r>
           </a:p>
           <a:p>
@@ -7190,7 +7198,7 @@
               </a:defRPr>
             </a:pPr>
             <a:r>
-              <a:t>3. Провести встречу с отделом продаж для обсуждения стратегии увеличения количества звонков и улучшения качества взаимодействия с клиентами.</a:t>
+              <a:t>3. Провести анализ эффективности работы отдела и выявить возможности для оптимизации.</a:t>
             </a:r>
           </a:p>
           <a:p>

</xml_diff>

<commit_message>
procore: OpenAI gpt-5-nano provider + traffic-light KPI coloring (PPTX/Slides)
</commit_message>
<xml_diff>
--- a/brief_compliant_20250901_20250907.pptx
+++ b/brief_compliant_20250901_20250907.pptx
@@ -4281,7 +4281,7 @@
               </a:defRPr>
             </a:pPr>
             <a:r>
-              <a:t>За период 01.09.2025—07.09.2025 количество перезвонить по заявкам составило 111 из 164 (67,7%), что свидетельствует о высокой конверсии. Количество обработанных заявок превысило плановое на 12,5% (18 из 16). Однако объём одобренных гарантий (186 млн) значительно превышает выданный (39 млн).</a:t>
+              <a:t>За период 01.09.2025—07.09.2025 количество перезвонить по заявкам составило 111 из 164 (67,7%), что свидетельствует о высокой конверсии. Однако количество обработанных заявок (18) превысило плановое количество (16) на 12,5%, а сумма заявок (646,0 млн) превысила плановую (204,0 млн) на 116,7%. Это может указывать на необходимость более тщательного планирования нагрузки.</a:t>
             </a:r>
           </a:p>
           <a:p>
@@ -4310,7 +4310,7 @@
               </a:defRPr>
             </a:pPr>
             <a:r>
-              <a:t>Узкое место: низкий процент выдачи гарантий по отношению к одобренным.</a:t>
+              <a:t>Узкое место: необходимо оптимизировать процесс обработки заявок для более точного планирования нагрузки.</a:t>
             </a:r>
           </a:p>
           <a:p>
@@ -4355,7 +4355,7 @@
               </a:defRPr>
             </a:pPr>
             <a:r>
-              <a:t>1. Проанализировать причины низкой выдачи по одобренным заявкам.</a:t>
+              <a:t>1. Проанализировать причины превышения плановых показателей по заявкам.</a:t>
             </a:r>
           </a:p>
           <a:p>
@@ -4371,7 +4371,7 @@
               </a:defRPr>
             </a:pPr>
             <a:r>
-              <a:t>2. Оптимизировать процесс выдачи гарантий для сокращения разрыва между одобрением и выдачей.</a:t>
+              <a:t>2. Скорректировать план обработки заявок с учётом полученных данных.</a:t>
             </a:r>
           </a:p>
           <a:p>
@@ -4387,7 +4387,7 @@
               </a:defRPr>
             </a:pPr>
             <a:r>
-              <a:t>3. Провести встречу с отделом обработки заявок для обсуждения текущих проблем и выработки решений.</a:t>
+              <a:t>3. Провести совещание с отделом для обсуждения результатов и выработки мер по оптимизации работы.</a:t>
             </a:r>
           </a:p>
         </p:txBody>
@@ -7092,7 +7092,7 @@
               </a:defRPr>
             </a:pPr>
             <a:r>
-              <a:t>За период с 01.09.2025 по 07.09.2025 количество перезвонить по заявкам составило 111 из 164 (67,7%), что является положительным результатом. Однако количество обработанных заявок превысило плановое (18 из 16, 112,5%) и сумма заявок значительно выше ожидаемой (646,0 из 204,0, 316,7%).</a:t>
+              <a:t>За период с 01.09.2025 по 07.09.2025 количество перезвонить по заявкам составило 111 из 164 (67,7%), что свидетельствует о необходимости улучшения работы с заявками. Количество поступивших заявок составило 18 при плане 16 (112,5%), а сумма заявок — 646,0 млн при плане 204,0 млн (316,7%). Это говорит о значительном превышении плановых показателей по сумме заявок. Однако сумма одобренных гарантий составила 186 млн, а выдано было 39 млн, что может указывать на задержки в процессе выдачи.</a:t>
             </a:r>
           </a:p>
           <a:p>
@@ -7121,7 +7121,7 @@
               </a:defRPr>
             </a:pPr>
             <a:r>
-              <a:t>Узкое место: необходимо оптимизировать процесс обработки заявок для соответствия плановым показателям.</a:t>
+              <a:t>Необходимо оптимизировать процесс обработки заявок и сократить время между одобрением и выдачей гарантий. Также следует уделить внимание повышению качества работы с клиентами для увеличения процента перезвонить. На неделю рекомендуется:</a:t>
             </a:r>
           </a:p>
           <a:p>
@@ -7136,6 +7136,9 @@
                 <a:latin typeface="Roboto"/>
               </a:defRPr>
             </a:pPr>
+            <a:r>
+              <a:t>1. Провести анализ причин задержек в выдаче гарантий.</a:t>
+            </a:r>
           </a:p>
           <a:p>
             <a:pPr>
@@ -7150,7 +7153,7 @@
               </a:defRPr>
             </a:pPr>
             <a:r>
-              <a:t>На неделю:</a:t>
+              <a:t>2. Разработать и внедрить меры по улучшению коммуникации с клиентами.</a:t>
             </a:r>
           </a:p>
           <a:p>
@@ -7166,39 +7169,7 @@
               </a:defRPr>
             </a:pPr>
             <a:r>
-              <a:t>1. Проанализировать причины превышения плановых показателей по заявкам.</a:t>
-            </a:r>
-          </a:p>
-          <a:p>
-            <a:pPr>
-              <a:lnSpc>
-                <a:spcPct val="130000"/>
-              </a:lnSpc>
-              <a:defRPr sz="1600">
-                <a:solidFill>
-                  <a:srgbClr val="222222"/>
-                </a:solidFill>
-                <a:latin typeface="Roboto"/>
-              </a:defRPr>
-            </a:pPr>
-            <a:r>
-              <a:t>2. Скорректировать процессы обработки заявок для достижения плановых показателей.</a:t>
-            </a:r>
-          </a:p>
-          <a:p>
-            <a:pPr>
-              <a:lnSpc>
-                <a:spcPct val="130000"/>
-              </a:lnSpc>
-              <a:defRPr sz="1600">
-                <a:solidFill>
-                  <a:srgbClr val="222222"/>
-                </a:solidFill>
-                <a:latin typeface="Roboto"/>
-              </a:defRPr>
-            </a:pPr>
-            <a:r>
-              <a:t>3. Провести анализ эффективности работы отдела и выявить возможности для оптимизации.</a:t>
+              <a:t>3. Оптимизировать внутренние процессы для сокращения времени между одобрением и выдачей.</a:t>
             </a:r>
           </a:p>
           <a:p>

</xml_diff>